<commit_message>
mod keymap for kana/eisuu
</commit_message>
<xml_diff>
--- a/mint60-keymap.pptx
+++ b/mint60-keymap.pptx
@@ -105,6 +105,11 @@
       </a:defRPr>
     </a:lvl9pPr>
   </p:defaultTextStyle>
+  <p:extLst>
+    <p:ext uri="{EFAFB233-063F-42B5-8137-9DF3F51BA10A}">
+      <p15:sldGuideLst xmlns:p15="http://schemas.microsoft.com/office/powerpoint/2012/main"/>
+    </p:ext>
+  </p:extLst>
 </p:presentation>
 </file>
 
@@ -257,7 +262,7 @@
           <a:p>
             <a:fld id="{6F2881DE-809A-1C48-B0D2-B6263D586221}" type="datetimeFigureOut">
               <a:rPr lang="en-US" altLang="ja-JP"/>
-              <a:t>7/16/20</a:t>
+              <a:t>8/5/20</a:t>
             </a:fld>
             <a:endParaRPr lang="ja-JP" altLang="en-US"/>
           </a:p>
@@ -489,7 +494,7 @@
           <a:p>
             <a:fld id="{6F2881DE-809A-1C48-B0D2-B6263D586221}" type="datetimeFigureOut">
               <a:rPr lang="en-US" altLang="ja-JP"/>
-              <a:t>7/16/20</a:t>
+              <a:t>8/5/20</a:t>
             </a:fld>
             <a:endParaRPr lang="ja-JP" altLang="en-US"/>
           </a:p>
@@ -731,7 +736,7 @@
           <a:p>
             <a:fld id="{6F2881DE-809A-1C48-B0D2-B6263D586221}" type="datetimeFigureOut">
               <a:rPr lang="en-US" altLang="ja-JP"/>
-              <a:t>7/16/20</a:t>
+              <a:t>8/5/20</a:t>
             </a:fld>
             <a:endParaRPr lang="ja-JP" altLang="en-US"/>
           </a:p>
@@ -963,7 +968,7 @@
           <a:p>
             <a:fld id="{6F2881DE-809A-1C48-B0D2-B6263D586221}" type="datetimeFigureOut">
               <a:rPr lang="en-US" altLang="ja-JP"/>
-              <a:t>7/16/20</a:t>
+              <a:t>8/5/20</a:t>
             </a:fld>
             <a:endParaRPr lang="ja-JP" altLang="en-US"/>
           </a:p>
@@ -1239,7 +1244,7 @@
           <a:p>
             <a:fld id="{6F2881DE-809A-1C48-B0D2-B6263D586221}" type="datetimeFigureOut">
               <a:rPr lang="en-US" altLang="ja-JP"/>
-              <a:t>7/16/20</a:t>
+              <a:t>8/5/20</a:t>
             </a:fld>
             <a:endParaRPr lang="ja-JP" altLang="en-US"/>
           </a:p>
@@ -1571,7 +1576,7 @@
           <a:p>
             <a:fld id="{6F2881DE-809A-1C48-B0D2-B6263D586221}" type="datetimeFigureOut">
               <a:rPr lang="en-US" altLang="ja-JP"/>
-              <a:t>7/16/20</a:t>
+              <a:t>8/5/20</a:t>
             </a:fld>
             <a:endParaRPr lang="ja-JP" altLang="en-US"/>
           </a:p>
@@ -2050,7 +2055,7 @@
           <a:p>
             <a:fld id="{6F2881DE-809A-1C48-B0D2-B6263D586221}" type="datetimeFigureOut">
               <a:rPr lang="en-US" altLang="ja-JP"/>
-              <a:t>7/16/20</a:t>
+              <a:t>8/5/20</a:t>
             </a:fld>
             <a:endParaRPr lang="ja-JP" altLang="en-US"/>
           </a:p>
@@ -2192,7 +2197,7 @@
           <a:p>
             <a:fld id="{6F2881DE-809A-1C48-B0D2-B6263D586221}" type="datetimeFigureOut">
               <a:rPr lang="en-US" altLang="ja-JP"/>
-              <a:t>7/16/20</a:t>
+              <a:t>8/5/20</a:t>
             </a:fld>
             <a:endParaRPr lang="ja-JP" altLang="en-US"/>
           </a:p>
@@ -2305,7 +2310,7 @@
           <a:p>
             <a:fld id="{6F2881DE-809A-1C48-B0D2-B6263D586221}" type="datetimeFigureOut">
               <a:rPr lang="en-US" altLang="ja-JP"/>
-              <a:t>7/16/20</a:t>
+              <a:t>8/5/20</a:t>
             </a:fld>
             <a:endParaRPr lang="ja-JP" altLang="en-US"/>
           </a:p>
@@ -2650,7 +2655,7 @@
           <a:p>
             <a:fld id="{6F2881DE-809A-1C48-B0D2-B6263D586221}" type="datetimeFigureOut">
               <a:rPr lang="en-US" altLang="ja-JP"/>
-              <a:t>7/16/20</a:t>
+              <a:t>8/5/20</a:t>
             </a:fld>
             <a:endParaRPr lang="ja-JP" altLang="en-US"/>
           </a:p>
@@ -2939,7 +2944,7 @@
           <a:p>
             <a:fld id="{6F2881DE-809A-1C48-B0D2-B6263D586221}" type="datetimeFigureOut">
               <a:rPr lang="en-US" altLang="ja-JP"/>
-              <a:t>7/16/20</a:t>
+              <a:t>8/5/20</a:t>
             </a:fld>
             <a:endParaRPr lang="ja-JP" altLang="en-US"/>
           </a:p>
@@ -3213,7 +3218,7 @@
           </a:lstStyle>
           <a:p>
             <a:fld id="{6F2881DE-809A-1C48-B0D2-B6263D586221}" type="datetimeFigureOut">
-              <a:t>2020/07/16</a:t>
+              <a:t>2020/8/5</a:t>
             </a:fld>
             <a:endParaRPr/>
           </a:p>
@@ -3644,7 +3649,7 @@
         </p:nvGrpSpPr>
         <p:grpSpPr>
           <a:xfrm>
-            <a:off x="-124598" y="-720090"/>
+            <a:off x="-124598" y="-215594"/>
             <a:ext cx="12441196" cy="8298180"/>
             <a:chOff x="955010" y="0"/>
             <a:chExt cx="10281980" cy="6858000"/>
@@ -3736,7 +3741,7 @@
                     <a:srgbClr val="C00000"/>
                   </a:solidFill>
                 </a:rPr>
-                <a:t>漢字</a:t>
+                <a:t>Tab</a:t>
               </a:r>
               <a:endParaRPr sz="1100">
                 <a:solidFill>
@@ -4761,7 +4766,7 @@
           </p:nvSpPr>
           <p:spPr>
             <a:xfrm>
-              <a:off x="6205062" y="4845702"/>
+              <a:off x="6015568" y="5666808"/>
               <a:ext cx="438737" cy="358346"/>
             </a:xfrm>
             <a:prstGeom prst="rect">
@@ -4893,8 +4898,8 @@
           </p:nvSpPr>
           <p:spPr>
             <a:xfrm>
-              <a:off x="7739180" y="4845702"/>
-              <a:ext cx="827619" cy="358346"/>
+              <a:off x="6118231" y="4845702"/>
+              <a:ext cx="474492" cy="358346"/>
             </a:xfrm>
             <a:prstGeom prst="rect">
               <a:avLst/>
@@ -4935,7 +4940,7 @@
                     <a:srgbClr val="C00000"/>
                   </a:solidFill>
                 </a:rPr>
-                <a:t>漢字</a:t>
+                <a:t>英数</a:t>
               </a:r>
               <a:endParaRPr sz="1100">
                 <a:solidFill>
@@ -4959,7 +4964,7 @@
           </p:nvSpPr>
           <p:spPr>
             <a:xfrm>
-              <a:off x="6861706" y="4845702"/>
+              <a:off x="7831932" y="4834159"/>
               <a:ext cx="438737" cy="358346"/>
             </a:xfrm>
             <a:prstGeom prst="rect">
@@ -5342,6 +5347,72 @@
           </p:txBody>
         </p:sp>
       </p:grpSp>
+      <p:sp>
+        <p:nvSpPr>
+          <p:cNvPr id="32" name="正方形/長方形 31">
+            <a:extLst>
+              <a:ext uri="{FF2B5EF4-FFF2-40B4-BE49-F238E27FC236}">
+                <a16:creationId xmlns:a16="http://schemas.microsoft.com/office/drawing/2014/main" id="{3D0E7AF8-B562-B844-A366-E013FE799543}"/>
+              </a:ext>
+            </a:extLst>
+          </p:cNvPr>
+          <p:cNvSpPr/>
+          <p:nvPr/>
+        </p:nvSpPr>
+        <p:spPr>
+          <a:xfrm>
+            <a:off x="6994821" y="5633738"/>
+            <a:ext cx="574135" cy="433599"/>
+          </a:xfrm>
+          <a:prstGeom prst="rect">
+            <a:avLst/>
+          </a:prstGeom>
+          <a:solidFill>
+            <a:schemeClr val="bg1"/>
+          </a:solidFill>
+          <a:ln>
+            <a:solidFill>
+              <a:schemeClr val="tx1"/>
+            </a:solidFill>
+          </a:ln>
+        </p:spPr>
+        <p:style>
+          <a:lnRef idx="2">
+            <a:schemeClr val="accent1">
+              <a:shade val="50000"/>
+            </a:schemeClr>
+          </a:lnRef>
+          <a:fillRef idx="1">
+            <a:schemeClr val="accent1"/>
+          </a:fillRef>
+          <a:effectRef idx="0">
+            <a:schemeClr val="accent1"/>
+          </a:effectRef>
+          <a:fontRef idx="minor">
+            <a:schemeClr val="lt1"/>
+          </a:fontRef>
+        </p:style>
+        <p:txBody>
+          <a:bodyPr rtlCol="0" anchor="ctr"/>
+          <a:lstStyle/>
+          <a:p>
+            <a:pPr algn="ctr"/>
+            <a:r>
+              <a:rPr lang="en-US" sz="1100">
+                <a:solidFill>
+                  <a:srgbClr val="C00000"/>
+                </a:solidFill>
+              </a:rPr>
+              <a:t>かな</a:t>
+            </a:r>
+            <a:endParaRPr sz="1100">
+              <a:solidFill>
+                <a:srgbClr val="C00000"/>
+              </a:solidFill>
+            </a:endParaRPr>
+          </a:p>
+        </p:txBody>
+      </p:sp>
     </p:spTree>
     <p:extLst>
       <p:ext uri="{BB962C8B-B14F-4D97-AF65-F5344CB8AC3E}">
@@ -5527,6 +5598,138 @@
               <a:t>CS-V</a:t>
             </a:r>
             <a:endParaRPr sz="1100" b="1">
+              <a:solidFill>
+                <a:srgbClr val="C00000"/>
+              </a:solidFill>
+            </a:endParaRPr>
+          </a:p>
+        </p:txBody>
+      </p:sp>
+      <p:sp>
+        <p:nvSpPr>
+          <p:cNvPr id="6" name="正方形/長方形 5">
+            <a:extLst>
+              <a:ext uri="{FF2B5EF4-FFF2-40B4-BE49-F238E27FC236}">
+                <a16:creationId xmlns:a16="http://schemas.microsoft.com/office/drawing/2014/main" id="{174CF927-9694-B841-8011-6621A326614D}"/>
+              </a:ext>
+            </a:extLst>
+          </p:cNvPr>
+          <p:cNvSpPr/>
+          <p:nvPr/>
+        </p:nvSpPr>
+        <p:spPr>
+          <a:xfrm>
+            <a:off x="1897333" y="4321889"/>
+            <a:ext cx="1001419" cy="433599"/>
+          </a:xfrm>
+          <a:prstGeom prst="rect">
+            <a:avLst/>
+          </a:prstGeom>
+          <a:solidFill>
+            <a:schemeClr val="bg1"/>
+          </a:solidFill>
+          <a:ln>
+            <a:solidFill>
+              <a:schemeClr val="tx1"/>
+            </a:solidFill>
+          </a:ln>
+        </p:spPr>
+        <p:style>
+          <a:lnRef idx="2">
+            <a:schemeClr val="accent1">
+              <a:shade val="50000"/>
+            </a:schemeClr>
+          </a:lnRef>
+          <a:fillRef idx="1">
+            <a:schemeClr val="accent1"/>
+          </a:fillRef>
+          <a:effectRef idx="0">
+            <a:schemeClr val="accent1"/>
+          </a:effectRef>
+          <a:fontRef idx="minor">
+            <a:schemeClr val="lt1"/>
+          </a:fontRef>
+        </p:style>
+        <p:txBody>
+          <a:bodyPr rtlCol="0" anchor="ctr"/>
+          <a:lstStyle/>
+          <a:p>
+            <a:pPr algn="ctr"/>
+            <a:r>
+              <a:rPr lang="en-US" sz="1100">
+                <a:solidFill>
+                  <a:srgbClr val="C00000"/>
+                </a:solidFill>
+              </a:rPr>
+              <a:t>F13</a:t>
+            </a:r>
+            <a:endParaRPr sz="1100">
+              <a:solidFill>
+                <a:srgbClr val="C00000"/>
+              </a:solidFill>
+            </a:endParaRPr>
+          </a:p>
+        </p:txBody>
+      </p:sp>
+      <p:sp>
+        <p:nvSpPr>
+          <p:cNvPr id="7" name="正方形/長方形 6">
+            <a:extLst>
+              <a:ext uri="{FF2B5EF4-FFF2-40B4-BE49-F238E27FC236}">
+                <a16:creationId xmlns:a16="http://schemas.microsoft.com/office/drawing/2014/main" id="{CCAC8C86-28D1-734C-8C34-4639AFB25208}"/>
+              </a:ext>
+            </a:extLst>
+          </p:cNvPr>
+          <p:cNvSpPr/>
+          <p:nvPr/>
+        </p:nvSpPr>
+        <p:spPr>
+          <a:xfrm>
+            <a:off x="1897332" y="3835740"/>
+            <a:ext cx="803827" cy="433599"/>
+          </a:xfrm>
+          <a:prstGeom prst="rect">
+            <a:avLst/>
+          </a:prstGeom>
+          <a:solidFill>
+            <a:schemeClr val="bg1"/>
+          </a:solidFill>
+          <a:ln>
+            <a:solidFill>
+              <a:schemeClr val="tx1"/>
+            </a:solidFill>
+          </a:ln>
+        </p:spPr>
+        <p:style>
+          <a:lnRef idx="2">
+            <a:schemeClr val="accent1">
+              <a:shade val="50000"/>
+            </a:schemeClr>
+          </a:lnRef>
+          <a:fillRef idx="1">
+            <a:schemeClr val="accent1"/>
+          </a:fillRef>
+          <a:effectRef idx="0">
+            <a:schemeClr val="accent1"/>
+          </a:effectRef>
+          <a:fontRef idx="minor">
+            <a:schemeClr val="lt1"/>
+          </a:fontRef>
+        </p:style>
+        <p:txBody>
+          <a:bodyPr rtlCol="0" anchor="ctr"/>
+          <a:lstStyle/>
+          <a:p>
+            <a:pPr algn="ctr"/>
+            <a:r>
+              <a:rPr lang="ja-JP" altLang="en-US" sz="1100">
+                <a:solidFill>
+                  <a:srgbClr val="C00000"/>
+                </a:solidFill>
+              </a:rPr>
+              <a:t>漢字</a:t>
+            </a:r>
+            <a:endParaRPr sz="1100">
               <a:solidFill>
                 <a:srgbClr val="C00000"/>
               </a:solidFill>

</xml_diff>